<commit_message>
Final Presentation day (#17)
* Tarak's README.md updates

* Final updates
</commit_message>
<xml_diff>
--- a/presentation/Project_one.pptx
+++ b/presentation/Project_one.pptx
@@ -242,7 +242,7 @@
             <a:fld id="{EFC10EE1-B198-C942-8235-326C972CBB30}" type="datetimeFigureOut">
               <a:rPr lang="en-US" smtClean="0"/>
               <a:pPr/>
-              <a:t>4/29/2021</a:t>
+              <a:t>5/1/2021</a:t>
             </a:fld>
             <a:endParaRPr lang="en-US" dirty="0"/>
           </a:p>
@@ -2958,14 +2958,14 @@
           </a:ln>
           <a:extLst>
             <a:ext uri="{909E8E84-426E-40dd-AFC4-6F175D3DCCD1}">
-              <a14:hiddenFill xmlns:a14="http://schemas.microsoft.com/office/drawing/2010/main" xmlns="">
+              <a14:hiddenFill xmlns="" xmlns:a14="http://schemas.microsoft.com/office/drawing/2010/main">
                 <a:solidFill>
                   <a:srgbClr val="FFFFFF"/>
                 </a:solidFill>
               </a14:hiddenFill>
             </a:ext>
             <a:ext uri="{91240B29-F687-4f45-9708-019B960494DF}">
-              <a14:hiddenLine xmlns:a14="http://schemas.microsoft.com/office/drawing/2010/main" xmlns="" w="12700">
+              <a14:hiddenLine xmlns="" xmlns:a14="http://schemas.microsoft.com/office/drawing/2010/main" w="12700">
                 <a:solidFill>
                   <a:schemeClr val="tx1"/>
                 </a:solidFill>
@@ -18157,7 +18157,7 @@
         <p:spPr>
           <a:xfrm>
             <a:off x="952521" y="3574874"/>
-            <a:ext cx="16938664" cy="7848302"/>
+            <a:ext cx="16938664" cy="8217634"/>
           </a:xfrm>
           <a:prstGeom prst="rect">
             <a:avLst/>
@@ -18376,6 +18376,36 @@
                 <a:ea typeface="Open Sans Light" panose="020B0306030504020204" pitchFamily="34" charset="0"/>
                 <a:cs typeface="Open Sans Light" panose="020B0306030504020204" pitchFamily="34" charset="0"/>
               </a:rPr>
+              <a:t>Merged analysis with </a:t>
+            </a:r>
+            <a:r>
+              <a:rPr lang="en-US" sz="2400" dirty="0" err="1">
+                <a:latin typeface="Open Sans Light" panose="020B0306030504020204" pitchFamily="34" charset="0"/>
+                <a:ea typeface="Open Sans Light" panose="020B0306030504020204" pitchFamily="34" charset="0"/>
+                <a:cs typeface="Open Sans Light" panose="020B0306030504020204" pitchFamily="34" charset="0"/>
+              </a:rPr>
+              <a:t>nbmerge</a:t>
+            </a:r>
+            <a:r>
+              <a:rPr lang="en-US" sz="2400" dirty="0">
+                <a:latin typeface="Open Sans Light" panose="020B0306030504020204" pitchFamily="34" charset="0"/>
+                <a:ea typeface="Open Sans Light" panose="020B0306030504020204" pitchFamily="34" charset="0"/>
+                <a:cs typeface="Open Sans Light" panose="020B0306030504020204" pitchFamily="34" charset="0"/>
+              </a:rPr>
+              <a:t> package</a:t>
+            </a:r>
+          </a:p>
+          <a:p>
+            <a:pPr marL="457200" indent="-457200">
+              <a:buFont typeface="+mj-lt"/>
+              <a:buAutoNum type="arabicPeriod"/>
+            </a:pPr>
+            <a:r>
+              <a:rPr lang="en-US" sz="2400" dirty="0">
+                <a:latin typeface="Open Sans Light" panose="020B0306030504020204" pitchFamily="34" charset="0"/>
+                <a:ea typeface="Open Sans Light" panose="020B0306030504020204" pitchFamily="34" charset="0"/>
+                <a:cs typeface="Open Sans Light" panose="020B0306030504020204" pitchFamily="34" charset="0"/>
+              </a:rPr>
               <a:t>Issues Resolved</a:t>
             </a:r>
           </a:p>
@@ -18573,14 +18603,14 @@
           </a:ln>
           <a:extLst>
             <a:ext uri="{909E8E84-426E-40dd-AFC4-6F175D3DCCD1}">
-              <a14:hiddenFill xmlns:a14="http://schemas.microsoft.com/office/drawing/2010/main" xmlns="">
+              <a14:hiddenFill xmlns="" xmlns:a14="http://schemas.microsoft.com/office/drawing/2010/main">
                 <a:solidFill>
                   <a:srgbClr val="FFFFFF"/>
                 </a:solidFill>
               </a14:hiddenFill>
             </a:ext>
             <a:ext uri="{91240B29-F687-4f45-9708-019B960494DF}">
-              <a14:hiddenLine xmlns:a14="http://schemas.microsoft.com/office/drawing/2010/main" xmlns="" w="12700">
+              <a14:hiddenLine xmlns="" xmlns:a14="http://schemas.microsoft.com/office/drawing/2010/main" w="12700">
                 <a:solidFill>
                   <a:schemeClr val="tx1"/>
                 </a:solidFill>

</xml_diff>